<commit_message>
Final Commit VJF v6.0
This is the final commit for version 6.0. It includes the latest
updates to the documentation and some test cases that were left out.
</commit_message>
<xml_diff>
--- a/Posters/Posters Virtual Job Fair-Ver6.0/Rene-Alfonso.pptx
+++ b/Posters/Posters Virtual Job Fair-Ver6.0/Rene-Alfonso.pptx
@@ -261,7 +261,7 @@
               <a:pPr>
                 <a:defRPr/>
               </a:pPr>
-              <a:t>7/27/15</a:t>
+              <a:t>8/2/15</a:t>
             </a:fld>
             <a:endParaRPr lang="en-US" altLang="en-US"/>
           </a:p>
@@ -11069,15 +11069,7 @@
                 <a:ea typeface="Times New Roman" charset="0"/>
                 <a:cs typeface="Times New Roman" charset="0"/>
               </a:rPr>
-              <a:t>V</a:t>
-            </a:r>
-            <a:r>
-              <a:rPr lang="en-US" sz="2400" dirty="0" smtClean="0">
-                <a:latin typeface="Times New Roman" charset="0"/>
-                <a:ea typeface="Times New Roman" charset="0"/>
-                <a:cs typeface="Times New Roman" charset="0"/>
-              </a:rPr>
-              <a:t>ideo resumes were stored on the server. It was brought to our attention, by product owner, Fernando </a:t>
+              <a:t>Video resumes were stored on the server. It was brought to our attention, by product owner, Fernando </a:t>
             </a:r>
             <a:r>
               <a:rPr lang="en-US" sz="2400" dirty="0" err="1" smtClean="0">
@@ -11112,7 +11104,15 @@
                 <a:ea typeface="Times New Roman" charset="0"/>
                 <a:cs typeface="Times New Roman" charset="0"/>
               </a:rPr>
-              <a:t>There were multiple bugs that needed to be fixed before the product could be released. The guest account had access to too many features which lead to security concerns. Students could type in the URL such as </a:t>
+              <a:t>There were multiple bugs that needed to be fixed before the product could be released. The guest account had access to too many features which lead to security concerns. Students could type in the URL such as ‘/</a:t>
+            </a:r>
+            <a:r>
+              <a:rPr lang="en-US" sz="2400" dirty="0" err="1" smtClean="0">
+                <a:latin typeface="Times New Roman" charset="0"/>
+                <a:ea typeface="Times New Roman" charset="0"/>
+                <a:cs typeface="Times New Roman" charset="0"/>
+              </a:rPr>
+              <a:t>JobFair</a:t>
             </a:r>
             <a:r>
               <a:rPr lang="en-US" sz="2400" dirty="0" smtClean="0">
@@ -11120,7 +11120,7 @@
                 <a:ea typeface="Times New Roman" charset="0"/>
                 <a:cs typeface="Times New Roman" charset="0"/>
               </a:rPr>
-              <a:t>‘/</a:t>
+              <a:t>/</a:t>
             </a:r>
             <a:r>
               <a:rPr lang="en-US" sz="2400" dirty="0" err="1" smtClean="0">
@@ -11128,7 +11128,7 @@
                 <a:ea typeface="Times New Roman" charset="0"/>
                 <a:cs typeface="Times New Roman" charset="0"/>
               </a:rPr>
-              <a:t>JobFair</a:t>
+              <a:t>index.php</a:t>
             </a:r>
             <a:r>
               <a:rPr lang="en-US" sz="2400" dirty="0" smtClean="0">
@@ -11136,7 +11136,7 @@
                 <a:ea typeface="Times New Roman" charset="0"/>
                 <a:cs typeface="Times New Roman" charset="0"/>
               </a:rPr>
-              <a:t>/</a:t>
+              <a:t>/home/</a:t>
             </a:r>
             <a:r>
               <a:rPr lang="en-US" sz="2400" dirty="0" err="1" smtClean="0">
@@ -11144,7 +11144,7 @@
                 <a:ea typeface="Times New Roman" charset="0"/>
                 <a:cs typeface="Times New Roman" charset="0"/>
               </a:rPr>
-              <a:t>index.php</a:t>
+              <a:t>employerhome</a:t>
             </a:r>
             <a:r>
               <a:rPr lang="en-US" sz="2400" dirty="0" smtClean="0">
@@ -11152,29 +11152,8 @@
                 <a:ea typeface="Times New Roman" charset="0"/>
                 <a:cs typeface="Times New Roman" charset="0"/>
               </a:rPr>
-              <a:t>/home/</a:t>
-            </a:r>
-            <a:r>
-              <a:rPr lang="en-US" sz="2400" dirty="0" err="1" smtClean="0">
-                <a:latin typeface="Times New Roman" charset="0"/>
-                <a:ea typeface="Times New Roman" charset="0"/>
-                <a:cs typeface="Times New Roman" charset="0"/>
-              </a:rPr>
-              <a:t>employerhome</a:t>
-            </a:r>
-            <a:r>
-              <a:rPr lang="en-US" sz="2400" dirty="0" smtClean="0">
-                <a:latin typeface="Times New Roman" charset="0"/>
-                <a:ea typeface="Times New Roman" charset="0"/>
-                <a:cs typeface="Times New Roman" charset="0"/>
-              </a:rPr>
               <a:t>/’ and would then be able to behave as an employer; being able to  post jobs, etc. None of the notifications were working correctly. You could upload PDF resumes; however, there were multiple bugs with that. A crucial one was that when a new PDF resume was uploaded the system kept the old resume, without any reference to it, wasting space. The system did not allow for multiple admins due to a bug that wouldn’t allow admins to have any other username but admin. </a:t>
             </a:r>
-            <a:endParaRPr lang="en-US" sz="2400" dirty="0" smtClean="0">
-              <a:latin typeface="Times New Roman" charset="0"/>
-              <a:ea typeface="Times New Roman" charset="0"/>
-              <a:cs typeface="Times New Roman" charset="0"/>
-            </a:endParaRPr>
           </a:p>
         </p:txBody>
       </p:sp>
@@ -13804,29 +13783,8 @@
                 <a:ea typeface="Times New Roman" charset="0"/>
                 <a:cs typeface="Times New Roman" charset="0"/>
               </a:rPr>
-              <a:t>Thanks to this project I learned about Web Development for the first time. I enhanced my knowledge of MySQL. I </a:t>
-            </a:r>
-            <a:r>
-              <a:rPr lang="en-US" altLang="en-US" sz="3000" dirty="0" smtClean="0">
-                <a:latin typeface="Times New Roman" charset="0"/>
-                <a:ea typeface="Times New Roman" charset="0"/>
-                <a:cs typeface="Times New Roman" charset="0"/>
-              </a:rPr>
-              <a:t>learned new </a:t>
-            </a:r>
-            <a:r>
-              <a:rPr lang="en-US" altLang="en-US" sz="3000" dirty="0" smtClean="0">
-                <a:latin typeface="Times New Roman" charset="0"/>
-                <a:ea typeface="Times New Roman" charset="0"/>
-                <a:cs typeface="Times New Roman" charset="0"/>
-              </a:rPr>
-              <a:t>programming languages: PHP, JavaScript and HMTL. </a:t>
-            </a:r>
-            <a:endParaRPr lang="en-US" altLang="en-US" sz="3000" dirty="0" smtClean="0">
-              <a:latin typeface="Times New Roman" charset="0"/>
-              <a:ea typeface="Times New Roman" charset="0"/>
-              <a:cs typeface="Times New Roman" charset="0"/>
-            </a:endParaRPr>
+              <a:t>Thanks to this project I learned about Web Development for the first time. I enhanced my knowledge of MySQL. I learned new programming languages: PHP, JavaScript and HMTL. </a:t>
+            </a:r>
           </a:p>
           <a:p>
             <a:pPr algn="just" eaLnBrk="1" hangingPunct="1"/>
@@ -13844,31 +13802,7 @@
                 <a:ea typeface="Times New Roman" charset="0"/>
                 <a:cs typeface="Times New Roman" charset="0"/>
               </a:rPr>
-              <a:t>Ultimately </a:t>
-            </a:r>
-            <a:r>
-              <a:rPr lang="en-US" altLang="en-US" sz="3000" dirty="0" smtClean="0">
-                <a:latin typeface="Times New Roman" charset="0"/>
-                <a:ea typeface="Times New Roman" charset="0"/>
-                <a:cs typeface="Times New Roman" charset="0"/>
-              </a:rPr>
-              <a:t>I am very proud of the work I accomplished and that I was able to contribute to the development of </a:t>
-            </a:r>
-            <a:r>
-              <a:rPr lang="en-US" altLang="en-US" sz="3000" dirty="0" smtClean="0">
-                <a:latin typeface="Times New Roman" charset="0"/>
-                <a:ea typeface="Times New Roman" charset="0"/>
-                <a:cs typeface="Times New Roman" charset="0"/>
-              </a:rPr>
-              <a:t>this awesome </a:t>
-            </a:r>
-            <a:r>
-              <a:rPr lang="en-US" altLang="en-US" sz="3000" dirty="0" smtClean="0">
-                <a:latin typeface="Times New Roman" charset="0"/>
-                <a:ea typeface="Times New Roman" charset="0"/>
-                <a:cs typeface="Times New Roman" charset="0"/>
-              </a:rPr>
-              <a:t>project to showcase my skills.</a:t>
+              <a:t>Ultimately I am very proud of the work I accomplished and that I was able to contribute to the development of this awesome project to showcase my skills.</a:t>
             </a:r>
           </a:p>
           <a:p>
@@ -14228,7 +14162,23 @@
                 <a:ea typeface="Times New Roman" charset="0"/>
                 <a:cs typeface="Times New Roman" charset="0"/>
               </a:rPr>
-              <a:t>developed </a:t>
+              <a:t>developed using </a:t>
+            </a:r>
+            <a:r>
+              <a:rPr lang="en-US" altLang="en-US" sz="2400" smtClean="0">
+                <a:latin typeface="Times New Roman" charset="0"/>
+                <a:ea typeface="Times New Roman" charset="0"/>
+                <a:cs typeface="Times New Roman" charset="0"/>
+              </a:rPr>
+              <a:t>the </a:t>
+            </a:r>
+            <a:r>
+              <a:rPr lang="en-US" altLang="en-US" sz="2400" smtClean="0">
+                <a:latin typeface="Times New Roman" charset="0"/>
+                <a:ea typeface="Times New Roman" charset="0"/>
+                <a:cs typeface="Times New Roman" charset="0"/>
+              </a:rPr>
+              <a:t>Scrum </a:t>
             </a:r>
             <a:r>
               <a:rPr lang="en-US" altLang="en-US" sz="2400" dirty="0" smtClean="0">
@@ -14236,15 +14186,7 @@
                 <a:ea typeface="Times New Roman" charset="0"/>
                 <a:cs typeface="Times New Roman" charset="0"/>
               </a:rPr>
-              <a:t>using the Scum software developing methodology. This new version builds up on the previous versions. User stories were created based on specifications by the product owners and the mentor. The user stories served as the specification guidelines of what would be developed. </a:t>
-            </a:r>
-            <a:r>
-              <a:rPr lang="en-US" altLang="en-US" sz="2400" dirty="0" smtClean="0">
-                <a:latin typeface="Times New Roman" charset="0"/>
-                <a:ea typeface="Times New Roman" charset="0"/>
-                <a:cs typeface="Times New Roman" charset="0"/>
-              </a:rPr>
-              <a:t>Different user stories required different software engineering approaches. Some of the most interesting approaches used were:</a:t>
+              <a:t>software developing methodology. This new version builds up on the previous versions. User stories were created based on specifications by the product owners and the mentor. The user stories served as the specification guidelines of what would be developed. Different user stories required different software engineering approaches. Some of the most interesting approaches used were:</a:t>
             </a:r>
           </a:p>
           <a:p>
@@ -14287,7 +14229,15 @@
                 <a:ea typeface="Times New Roman" charset="0"/>
                 <a:cs typeface="Times New Roman" charset="0"/>
               </a:rPr>
-              <a:t>avoid having many points of entry into the YouTube subsystem </a:t>
+              <a:t>avoid having many points of entry into the YouTube subsystem I</a:t>
+            </a:r>
+            <a:r>
+              <a:rPr lang="en-US" sz="2400" dirty="0" smtClean="0">
+                <a:latin typeface="Times New Roman" charset="0"/>
+                <a:ea typeface="Times New Roman" charset="0"/>
+                <a:cs typeface="Times New Roman" charset="0"/>
+              </a:rPr>
+              <a:t> </a:t>
             </a:r>
             <a:r>
               <a:rPr lang="en-US" sz="2400" dirty="0">
@@ -14295,7 +14245,7 @@
                 <a:ea typeface="Times New Roman" charset="0"/>
                 <a:cs typeface="Times New Roman" charset="0"/>
               </a:rPr>
-              <a:t>I</a:t>
+              <a:t>added a Facade design pattern. </a:t>
             </a:r>
             <a:r>
               <a:rPr lang="en-US" sz="2400" dirty="0" smtClean="0">
@@ -14303,7 +14253,15 @@
                 <a:ea typeface="Times New Roman" charset="0"/>
                 <a:cs typeface="Times New Roman" charset="0"/>
               </a:rPr>
-              <a:t> </a:t>
+              <a:t>The </a:t>
+            </a:r>
+            <a:r>
+              <a:rPr lang="en-US" sz="2400" dirty="0" err="1">
+                <a:latin typeface="Times New Roman" charset="0"/>
+                <a:ea typeface="Times New Roman" charset="0"/>
+                <a:cs typeface="Times New Roman" charset="0"/>
+              </a:rPr>
+              <a:t>YouTubeHandler</a:t>
             </a:r>
             <a:r>
               <a:rPr lang="en-US" sz="2400" dirty="0">
@@ -14311,7 +14269,7 @@
                 <a:ea typeface="Times New Roman" charset="0"/>
                 <a:cs typeface="Times New Roman" charset="0"/>
               </a:rPr>
-              <a:t>added a Facade design pattern. </a:t>
+              <a:t> controller class realizes a Facade design pattern. It was created to facilitate access to the many YouTube API calls via a single point of entry. That is, a single access point into the subsystem. </a:t>
             </a:r>
             <a:r>
               <a:rPr lang="en-US" sz="2400" dirty="0" smtClean="0">
@@ -14319,15 +14277,7 @@
                 <a:ea typeface="Times New Roman" charset="0"/>
                 <a:cs typeface="Times New Roman" charset="0"/>
               </a:rPr>
-              <a:t>The </a:t>
-            </a:r>
-            <a:r>
-              <a:rPr lang="en-US" sz="2400" dirty="0" err="1">
-                <a:latin typeface="Times New Roman" charset="0"/>
-                <a:ea typeface="Times New Roman" charset="0"/>
-                <a:cs typeface="Times New Roman" charset="0"/>
-              </a:rPr>
-              <a:t>YouTubeHandler</a:t>
+              <a:t>This </a:t>
             </a:r>
             <a:r>
               <a:rPr lang="en-US" sz="2400" dirty="0">
@@ -14335,7 +14285,7 @@
                 <a:ea typeface="Times New Roman" charset="0"/>
                 <a:cs typeface="Times New Roman" charset="0"/>
               </a:rPr>
-              <a:t> controller class realizes a Facade design pattern. It was created to facilitate access to the many YouTube API calls via a single point of entry. That is, a single access point into the subsystem. </a:t>
+              <a:t>simplified the amount of dependencies between objects by encapsulating most of the </a:t>
             </a:r>
             <a:r>
               <a:rPr lang="en-US" sz="2400" dirty="0" smtClean="0">
@@ -14343,7 +14293,7 @@
                 <a:ea typeface="Times New Roman" charset="0"/>
                 <a:cs typeface="Times New Roman" charset="0"/>
               </a:rPr>
-              <a:t>This </a:t>
+              <a:t>functionality. The </a:t>
             </a:r>
             <a:r>
               <a:rPr lang="en-US" sz="2400" dirty="0">
@@ -14351,7 +14301,7 @@
                 <a:ea typeface="Times New Roman" charset="0"/>
                 <a:cs typeface="Times New Roman" charset="0"/>
               </a:rPr>
-              <a:t>simplified the amount of dependencies between objects by encapsulating most of the </a:t>
+              <a:t>F</a:t>
             </a:r>
             <a:r>
               <a:rPr lang="en-US" sz="2400" dirty="0" smtClean="0">
@@ -14359,7 +14309,7 @@
                 <a:ea typeface="Times New Roman" charset="0"/>
                 <a:cs typeface="Times New Roman" charset="0"/>
               </a:rPr>
-              <a:t>functionality. The </a:t>
+              <a:t>acade </a:t>
             </a:r>
             <a:r>
               <a:rPr lang="en-US" sz="2400" dirty="0">
@@ -14367,7 +14317,7 @@
                 <a:ea typeface="Times New Roman" charset="0"/>
                 <a:cs typeface="Times New Roman" charset="0"/>
               </a:rPr>
-              <a:t>F</a:t>
+              <a:t>keeps a reference to each object that will be called inside the </a:t>
             </a:r>
             <a:r>
               <a:rPr lang="en-US" sz="2400" dirty="0" smtClean="0">
@@ -14375,7 +14325,7 @@
                 <a:ea typeface="Times New Roman" charset="0"/>
                 <a:cs typeface="Times New Roman" charset="0"/>
               </a:rPr>
-              <a:t>acade </a:t>
+              <a:t>API. It has </a:t>
             </a:r>
             <a:r>
               <a:rPr lang="en-US" sz="2400" dirty="0">
@@ -14383,29 +14333,8 @@
                 <a:ea typeface="Times New Roman" charset="0"/>
                 <a:cs typeface="Times New Roman" charset="0"/>
               </a:rPr>
-              <a:t>keeps a reference to each object that will be called inside the </a:t>
-            </a:r>
-            <a:r>
-              <a:rPr lang="en-US" sz="2400" dirty="0" smtClean="0">
-                <a:latin typeface="Times New Roman" charset="0"/>
-                <a:ea typeface="Times New Roman" charset="0"/>
-                <a:cs typeface="Times New Roman" charset="0"/>
-              </a:rPr>
-              <a:t>API. It has </a:t>
-            </a:r>
-            <a:r>
-              <a:rPr lang="en-US" sz="2400" dirty="0">
-                <a:latin typeface="Times New Roman" charset="0"/>
-                <a:ea typeface="Times New Roman" charset="0"/>
-                <a:cs typeface="Times New Roman" charset="0"/>
-              </a:rPr>
               <a:t>made the YouTube API easier to use, understand, and test due to its convenient functions for common tasks. Other controllers need not care how the logic happens, they only need but call one function in the Facade and wait for the desired results.</a:t>
             </a:r>
-            <a:endParaRPr lang="en-US" sz="2400" dirty="0">
-              <a:latin typeface="Times New Roman" charset="0"/>
-              <a:ea typeface="Times New Roman" charset="0"/>
-              <a:cs typeface="Times New Roman" charset="0"/>
-            </a:endParaRPr>
           </a:p>
           <a:p>
             <a:pPr algn="just" eaLnBrk="1" hangingPunct="1"/>
@@ -14485,15 +14414,7 @@
                 <a:ea typeface="Times New Roman" charset="0"/>
                 <a:cs typeface="Times New Roman" charset="0"/>
               </a:rPr>
-              <a:t>JavaScript </a:t>
-            </a:r>
-            <a:r>
-              <a:rPr lang="en-US" altLang="en-US" sz="2400" dirty="0">
-                <a:latin typeface="Times New Roman" charset="0"/>
-                <a:ea typeface="Times New Roman" charset="0"/>
-                <a:cs typeface="Times New Roman" charset="0"/>
-              </a:rPr>
-              <a:t>and jQuery were used on the front-end for validation, and combined with HTML5 and Bootstrap </a:t>
+              <a:t>JavaScript and jQuery were used on the front-end for validation, and combined with HTML5 and Bootstrap </a:t>
             </a:r>
             <a:r>
               <a:rPr lang="en-US" altLang="en-US" sz="2400" dirty="0" smtClean="0">

</xml_diff>